<commit_message>
Intro and exp modified.
</commit_message>
<xml_diff>
--- a/ranking/doc/figures/model.pptx
+++ b/ranking/doc/figures/model.pptx
@@ -3456,7 +3456,7 @@
           <a:graphicData uri="http://schemas.openxmlformats.org/presentationml/2006/ole">
             <mc:AlternateContent xmlns:mc="http://schemas.openxmlformats.org/markup-compatibility/2006">
               <mc:Choice xmlns:v="urn:schemas-microsoft-com:vml" Requires="v">
-                <p:oleObj spid="_x0000_s1160" name="Equation" r:id="rId3" imgW="215640" imgH="228600" progId="Equation.DSMT4">
+                <p:oleObj spid="_x0000_s1170" name="Equation" r:id="rId3" imgW="215640" imgH="228600" progId="Equation.DSMT4">
                   <p:embed/>
                 </p:oleObj>
               </mc:Choice>
@@ -3521,7 +3521,7 @@
           <a:graphicData uri="http://schemas.openxmlformats.org/presentationml/2006/ole">
             <mc:AlternateContent xmlns:mc="http://schemas.openxmlformats.org/markup-compatibility/2006">
               <mc:Choice xmlns:v="urn:schemas-microsoft-com:vml" Requires="v">
-                <p:oleObj spid="_x0000_s1161" name="Equation" r:id="rId5" imgW="228600" imgH="228600" progId="Equation.DSMT4">
+                <p:oleObj spid="_x0000_s1171" name="Equation" r:id="rId5" imgW="228600" imgH="228600" progId="Equation.DSMT4">
                   <p:embed/>
                 </p:oleObj>
               </mc:Choice>
@@ -3586,7 +3586,7 @@
           <a:graphicData uri="http://schemas.openxmlformats.org/presentationml/2006/ole">
             <mc:AlternateContent xmlns:mc="http://schemas.openxmlformats.org/markup-compatibility/2006">
               <mc:Choice xmlns:v="urn:schemas-microsoft-com:vml" Requires="v">
-                <p:oleObj spid="_x0000_s1162" name="Equation" r:id="rId7" imgW="215640" imgH="228600" progId="Equation.DSMT4">
+                <p:oleObj spid="_x0000_s1172" name="Equation" r:id="rId7" imgW="215640" imgH="228600" progId="Equation.DSMT4">
                   <p:embed/>
                 </p:oleObj>
               </mc:Choice>
@@ -3651,7 +3651,7 @@
           <a:graphicData uri="http://schemas.openxmlformats.org/presentationml/2006/ole">
             <mc:AlternateContent xmlns:mc="http://schemas.openxmlformats.org/markup-compatibility/2006">
               <mc:Choice xmlns:v="urn:schemas-microsoft-com:vml" Requires="v">
-                <p:oleObj spid="_x0000_s1163" name="Equation" r:id="rId9" imgW="228600" imgH="228600" progId="Equation.DSMT4">
+                <p:oleObj spid="_x0000_s1173" name="Equation" r:id="rId9" imgW="228600" imgH="228600" progId="Equation.DSMT4">
                   <p:embed/>
                 </p:oleObj>
               </mc:Choice>
@@ -3716,7 +3716,7 @@
           <a:graphicData uri="http://schemas.openxmlformats.org/presentationml/2006/ole">
             <mc:AlternateContent xmlns:mc="http://schemas.openxmlformats.org/markup-compatibility/2006">
               <mc:Choice xmlns:v="urn:schemas-microsoft-com:vml" Requires="v">
-                <p:oleObj spid="_x0000_s1164" name="Equation" r:id="rId11" imgW="228600" imgH="228600" progId="Equation.DSMT4">
+                <p:oleObj spid="_x0000_s1174" name="Equation" r:id="rId11" imgW="228600" imgH="228600" progId="Equation.DSMT4">
                   <p:embed/>
                 </p:oleObj>
               </mc:Choice>
@@ -4497,7 +4497,7 @@
           <a:graphicData uri="http://schemas.openxmlformats.org/presentationml/2006/ole">
             <mc:AlternateContent xmlns:mc="http://schemas.openxmlformats.org/markup-compatibility/2006">
               <mc:Choice xmlns:v="urn:schemas-microsoft-com:vml" Requires="v">
-                <p:oleObj spid="_x0000_s2151" name="Equation" r:id="rId3" imgW="215640" imgH="228600" progId="Equation.DSMT4">
+                <p:oleObj spid="_x0000_s2161" name="Equation" r:id="rId3" imgW="215640" imgH="228600" progId="Equation.DSMT4">
                   <p:embed/>
                 </p:oleObj>
               </mc:Choice>
@@ -4562,7 +4562,7 @@
           <a:graphicData uri="http://schemas.openxmlformats.org/presentationml/2006/ole">
             <mc:AlternateContent xmlns:mc="http://schemas.openxmlformats.org/markup-compatibility/2006">
               <mc:Choice xmlns:v="urn:schemas-microsoft-com:vml" Requires="v">
-                <p:oleObj spid="_x0000_s2152" name="Equation" r:id="rId5" imgW="228600" imgH="228600" progId="Equation.DSMT4">
+                <p:oleObj spid="_x0000_s2162" name="Equation" r:id="rId5" imgW="228600" imgH="228600" progId="Equation.DSMT4">
                   <p:embed/>
                 </p:oleObj>
               </mc:Choice>
@@ -4846,7 +4846,7 @@
           <a:graphicData uri="http://schemas.openxmlformats.org/presentationml/2006/ole">
             <mc:AlternateContent xmlns:mc="http://schemas.openxmlformats.org/markup-compatibility/2006">
               <mc:Choice xmlns:v="urn:schemas-microsoft-com:vml" Requires="v">
-                <p:oleObj spid="_x0000_s2153" name="Equation" r:id="rId7" imgW="215640" imgH="228600" progId="Equation.DSMT4">
+                <p:oleObj spid="_x0000_s2163" name="Equation" r:id="rId7" imgW="215640" imgH="228600" progId="Equation.DSMT4">
                   <p:embed/>
                 </p:oleObj>
               </mc:Choice>
@@ -4911,7 +4911,7 @@
           <a:graphicData uri="http://schemas.openxmlformats.org/presentationml/2006/ole">
             <mc:AlternateContent xmlns:mc="http://schemas.openxmlformats.org/markup-compatibility/2006">
               <mc:Choice xmlns:v="urn:schemas-microsoft-com:vml" Requires="v">
-                <p:oleObj spid="_x0000_s2154" name="Equation" r:id="rId9" imgW="228600" imgH="228600" progId="Equation.DSMT4">
+                <p:oleObj spid="_x0000_s2164" name="Equation" r:id="rId9" imgW="228600" imgH="228600" progId="Equation.DSMT4">
                   <p:embed/>
                 </p:oleObj>
               </mc:Choice>
@@ -4976,7 +4976,7 @@
           <a:graphicData uri="http://schemas.openxmlformats.org/presentationml/2006/ole">
             <mc:AlternateContent xmlns:mc="http://schemas.openxmlformats.org/markup-compatibility/2006">
               <mc:Choice xmlns:v="urn:schemas-microsoft-com:vml" Requires="v">
-                <p:oleObj spid="_x0000_s2155" name="Equation" r:id="rId11" imgW="228600" imgH="228600" progId="Equation.DSMT4">
+                <p:oleObj spid="_x0000_s2165" name="Equation" r:id="rId11" imgW="228600" imgH="228600" progId="Equation.DSMT4">
                   <p:embed/>
                 </p:oleObj>
               </mc:Choice>
@@ -5329,7 +5329,7 @@
           <a:graphicData uri="http://schemas.openxmlformats.org/presentationml/2006/ole">
             <mc:AlternateContent xmlns:mc="http://schemas.openxmlformats.org/markup-compatibility/2006">
               <mc:Choice xmlns:v="urn:schemas-microsoft-com:vml" Requires="v">
-                <p:oleObj spid="_x0000_s3165" name="Equation" r:id="rId3" imgW="215640" imgH="228600" progId="Equation.DSMT4">
+                <p:oleObj spid="_x0000_s3175" name="Equation" r:id="rId3" imgW="215640" imgH="228600" progId="Equation.DSMT4">
                   <p:embed/>
                 </p:oleObj>
               </mc:Choice>
@@ -5394,7 +5394,7 @@
           <a:graphicData uri="http://schemas.openxmlformats.org/presentationml/2006/ole">
             <mc:AlternateContent xmlns:mc="http://schemas.openxmlformats.org/markup-compatibility/2006">
               <mc:Choice xmlns:v="urn:schemas-microsoft-com:vml" Requires="v">
-                <p:oleObj spid="_x0000_s3166" name="Equation" r:id="rId5" imgW="228600" imgH="228600" progId="Equation.DSMT4">
+                <p:oleObj spid="_x0000_s3176" name="Equation" r:id="rId5" imgW="228600" imgH="228600" progId="Equation.DSMT4">
                   <p:embed/>
                 </p:oleObj>
               </mc:Choice>
@@ -5594,7 +5594,7 @@
           <a:graphicData uri="http://schemas.openxmlformats.org/presentationml/2006/ole">
             <mc:AlternateContent xmlns:mc="http://schemas.openxmlformats.org/markup-compatibility/2006">
               <mc:Choice xmlns:v="urn:schemas-microsoft-com:vml" Requires="v">
-                <p:oleObj spid="_x0000_s3167" name="Equation" r:id="rId7" imgW="215640" imgH="228600" progId="Equation.DSMT4">
+                <p:oleObj spid="_x0000_s3177" name="Equation" r:id="rId7" imgW="215640" imgH="228600" progId="Equation.DSMT4">
                   <p:embed/>
                 </p:oleObj>
               </mc:Choice>
@@ -5659,7 +5659,7 @@
           <a:graphicData uri="http://schemas.openxmlformats.org/presentationml/2006/ole">
             <mc:AlternateContent xmlns:mc="http://schemas.openxmlformats.org/markup-compatibility/2006">
               <mc:Choice xmlns:v="urn:schemas-microsoft-com:vml" Requires="v">
-                <p:oleObj spid="_x0000_s3168" name="Equation" r:id="rId9" imgW="228600" imgH="228600" progId="Equation.DSMT4">
+                <p:oleObj spid="_x0000_s3178" name="Equation" r:id="rId9" imgW="228600" imgH="228600" progId="Equation.DSMT4">
                   <p:embed/>
                 </p:oleObj>
               </mc:Choice>
@@ -5724,7 +5724,7 @@
           <a:graphicData uri="http://schemas.openxmlformats.org/presentationml/2006/ole">
             <mc:AlternateContent xmlns:mc="http://schemas.openxmlformats.org/markup-compatibility/2006">
               <mc:Choice xmlns:v="urn:schemas-microsoft-com:vml" Requires="v">
-                <p:oleObj spid="_x0000_s3169" name="Equation" r:id="rId11" imgW="228600" imgH="228600" progId="Equation.DSMT4">
+                <p:oleObj spid="_x0000_s3179" name="Equation" r:id="rId11" imgW="228600" imgH="228600" progId="Equation.DSMT4">
                   <p:embed/>
                 </p:oleObj>
               </mc:Choice>

</xml_diff>